<commit_message>
just for you tyler
</commit_message>
<xml_diff>
--- a/violations-penn.pptx
+++ b/violations-penn.pptx
@@ -6,6 +6,7 @@
   </p:sldMasterIdLst>
   <p:sldIdLst>
     <p:sldId id="256" r:id="rId2"/>
+    <p:sldId id="257" r:id="rId3"/>
   </p:sldIdLst>
   <p:sldSz cx="12192000" cy="6858000"/>
   <p:notesSz cx="6858000" cy="9144000"/>
@@ -104,6 +105,11 @@
       </a:defRPr>
     </a:lvl9pPr>
   </p:defaultTextStyle>
+  <p:extLst>
+    <p:ext uri="{EFAFB233-063F-42B5-8137-9DF3F51BA10A}">
+      <p15:sldGuideLst xmlns:p15="http://schemas.microsoft.com/office/powerpoint/2012/main"/>
+    </p:ext>
+  </p:extLst>
 </p:presentation>
 </file>
 
@@ -238,7 +244,7 @@
           <a:p>
             <a:fld id="{F5DF6BC8-778A-2541-9AE5-80313E3B1829}" type="datetimeFigureOut">
               <a:rPr lang="en-US" smtClean="0"/>
-              <a:t>1/29/16</a:t>
+              <a:t>1/31/16</a:t>
             </a:fld>
             <a:endParaRPr lang="en-US"/>
           </a:p>
@@ -408,7 +414,7 @@
           <a:p>
             <a:fld id="{F5DF6BC8-778A-2541-9AE5-80313E3B1829}" type="datetimeFigureOut">
               <a:rPr lang="en-US" smtClean="0"/>
-              <a:t>1/29/16</a:t>
+              <a:t>1/31/16</a:t>
             </a:fld>
             <a:endParaRPr lang="en-US"/>
           </a:p>
@@ -588,7 +594,7 @@
           <a:p>
             <a:fld id="{F5DF6BC8-778A-2541-9AE5-80313E3B1829}" type="datetimeFigureOut">
               <a:rPr lang="en-US" smtClean="0"/>
-              <a:t>1/29/16</a:t>
+              <a:t>1/31/16</a:t>
             </a:fld>
             <a:endParaRPr lang="en-US"/>
           </a:p>
@@ -758,7 +764,7 @@
           <a:p>
             <a:fld id="{F5DF6BC8-778A-2541-9AE5-80313E3B1829}" type="datetimeFigureOut">
               <a:rPr lang="en-US" smtClean="0"/>
-              <a:t>1/29/16</a:t>
+              <a:t>1/31/16</a:t>
             </a:fld>
             <a:endParaRPr lang="en-US"/>
           </a:p>
@@ -1004,7 +1010,7 @@
           <a:p>
             <a:fld id="{F5DF6BC8-778A-2541-9AE5-80313E3B1829}" type="datetimeFigureOut">
               <a:rPr lang="en-US" smtClean="0"/>
-              <a:t>1/29/16</a:t>
+              <a:t>1/31/16</a:t>
             </a:fld>
             <a:endParaRPr lang="en-US"/>
           </a:p>
@@ -1236,7 +1242,7 @@
           <a:p>
             <a:fld id="{F5DF6BC8-778A-2541-9AE5-80313E3B1829}" type="datetimeFigureOut">
               <a:rPr lang="en-US" smtClean="0"/>
-              <a:t>1/29/16</a:t>
+              <a:t>1/31/16</a:t>
             </a:fld>
             <a:endParaRPr lang="en-US"/>
           </a:p>
@@ -1603,7 +1609,7 @@
           <a:p>
             <a:fld id="{F5DF6BC8-778A-2541-9AE5-80313E3B1829}" type="datetimeFigureOut">
               <a:rPr lang="en-US" smtClean="0"/>
-              <a:t>1/29/16</a:t>
+              <a:t>1/31/16</a:t>
             </a:fld>
             <a:endParaRPr lang="en-US"/>
           </a:p>
@@ -1721,7 +1727,7 @@
           <a:p>
             <a:fld id="{F5DF6BC8-778A-2541-9AE5-80313E3B1829}" type="datetimeFigureOut">
               <a:rPr lang="en-US" smtClean="0"/>
-              <a:t>1/29/16</a:t>
+              <a:t>1/31/16</a:t>
             </a:fld>
             <a:endParaRPr lang="en-US"/>
           </a:p>
@@ -1816,7 +1822,7 @@
           <a:p>
             <a:fld id="{F5DF6BC8-778A-2541-9AE5-80313E3B1829}" type="datetimeFigureOut">
               <a:rPr lang="en-US" smtClean="0"/>
-              <a:t>1/29/16</a:t>
+              <a:t>1/31/16</a:t>
             </a:fld>
             <a:endParaRPr lang="en-US"/>
           </a:p>
@@ -2093,7 +2099,7 @@
           <a:p>
             <a:fld id="{F5DF6BC8-778A-2541-9AE5-80313E3B1829}" type="datetimeFigureOut">
               <a:rPr lang="en-US" smtClean="0"/>
-              <a:t>1/29/16</a:t>
+              <a:t>1/31/16</a:t>
             </a:fld>
             <a:endParaRPr lang="en-US"/>
           </a:p>
@@ -2346,7 +2352,7 @@
           <a:p>
             <a:fld id="{F5DF6BC8-778A-2541-9AE5-80313E3B1829}" type="datetimeFigureOut">
               <a:rPr lang="en-US" smtClean="0"/>
-              <a:t>1/29/16</a:t>
+              <a:t>1/31/16</a:t>
             </a:fld>
             <a:endParaRPr lang="en-US"/>
           </a:p>
@@ -2559,7 +2565,7 @@
           <a:p>
             <a:fld id="{F5DF6BC8-778A-2541-9AE5-80313E3B1829}" type="datetimeFigureOut">
               <a:rPr lang="en-US" smtClean="0"/>
-              <a:t>1/29/16</a:t>
+              <a:t>1/31/16</a:t>
             </a:fld>
             <a:endParaRPr lang="en-US"/>
           </a:p>
@@ -2990,22 +2996,20 @@
       </p:pic>
       <p:sp>
         <p:nvSpPr>
-          <p:cNvPr id="17" name="Oval 16"/>
+          <p:cNvPr id="3" name="Oval 2"/>
           <p:cNvSpPr/>
           <p:nvPr/>
         </p:nvSpPr>
         <p:spPr>
           <a:xfrm>
-            <a:off x="7643590" y="840079"/>
-            <a:ext cx="2211105" cy="2188401"/>
+            <a:off x="10212860" y="4913009"/>
+            <a:ext cx="1085850" cy="985838"/>
           </a:xfrm>
           <a:prstGeom prst="ellipse">
             <a:avLst/>
           </a:prstGeom>
           <a:solidFill>
-            <a:schemeClr val="bg2">
-              <a:lumMod val="90000"/>
-            </a:schemeClr>
+            <a:srgbClr val="C654B6"/>
           </a:solidFill>
         </p:spPr>
         <p:style>
@@ -3030,39 +3034,29 @@
           <a:p>
             <a:pPr algn="ctr"/>
             <a:r>
-              <a:rPr lang="en-US" smtClean="0">
-                <a:solidFill>
-                  <a:schemeClr val="tx1"/>
-                </a:solidFill>
-              </a:rPr>
-              <a:t>1783</a:t>
-            </a:r>
-            <a:endParaRPr lang="en-US">
-              <a:solidFill>
-                <a:schemeClr val="tx1"/>
-              </a:solidFill>
-            </a:endParaRPr>
-          </a:p>
-        </p:txBody>
-      </p:sp>
-      <p:sp>
-        <p:nvSpPr>
-          <p:cNvPr id="18" name="Oval 17"/>
+              <a:rPr lang="en-US" dirty="0" smtClean="0"/>
+              <a:t>3.45</a:t>
+            </a:r>
+            <a:endParaRPr lang="en-US" dirty="0"/>
+          </a:p>
+        </p:txBody>
+      </p:sp>
+      <p:sp>
+        <p:nvSpPr>
+          <p:cNvPr id="6" name="Oval 5"/>
           <p:cNvSpPr/>
           <p:nvPr/>
         </p:nvSpPr>
         <p:spPr>
           <a:xfrm>
-            <a:off x="5318842" y="1365149"/>
-            <a:ext cx="1582021" cy="1663331"/>
+            <a:off x="1538288" y="4347873"/>
+            <a:ext cx="957262" cy="885825"/>
           </a:xfrm>
           <a:prstGeom prst="ellipse">
             <a:avLst/>
           </a:prstGeom>
           <a:solidFill>
-            <a:schemeClr val="bg2">
-              <a:lumMod val="90000"/>
-            </a:schemeClr>
+            <a:srgbClr val="C654B6"/>
           </a:solidFill>
         </p:spPr>
         <p:style>
@@ -3087,39 +3081,29 @@
           <a:p>
             <a:pPr algn="ctr"/>
             <a:r>
-              <a:rPr lang="en-US" dirty="0" smtClean="0">
-                <a:solidFill>
-                  <a:schemeClr val="tx1"/>
-                </a:solidFill>
-              </a:rPr>
-              <a:t>1252</a:t>
-            </a:r>
-            <a:endParaRPr lang="en-US" dirty="0">
-              <a:solidFill>
-                <a:schemeClr val="tx1"/>
-              </a:solidFill>
-            </a:endParaRPr>
-          </a:p>
-        </p:txBody>
-      </p:sp>
-      <p:sp>
-        <p:nvSpPr>
-          <p:cNvPr id="19" name="Oval 18"/>
+              <a:rPr lang="en-US" dirty="0" smtClean="0"/>
+              <a:t>1.6</a:t>
+            </a:r>
+            <a:endParaRPr lang="en-US" dirty="0"/>
+          </a:p>
+        </p:txBody>
+      </p:sp>
+      <p:sp>
+        <p:nvSpPr>
+          <p:cNvPr id="9" name="Oval 8"/>
           <p:cNvSpPr/>
           <p:nvPr/>
         </p:nvSpPr>
         <p:spPr>
           <a:xfrm>
-            <a:off x="4170646" y="3028480"/>
-            <a:ext cx="615668" cy="560463"/>
+            <a:off x="7925127" y="4913009"/>
+            <a:ext cx="1247448" cy="1130604"/>
           </a:xfrm>
           <a:prstGeom prst="ellipse">
             <a:avLst/>
           </a:prstGeom>
           <a:solidFill>
-            <a:schemeClr val="bg2">
-              <a:lumMod val="90000"/>
-            </a:schemeClr>
+            <a:srgbClr val="C654B6"/>
           </a:solidFill>
         </p:spPr>
         <p:style>
@@ -3144,39 +3128,29 @@
           <a:p>
             <a:pPr algn="ctr"/>
             <a:r>
-              <a:rPr lang="en-US" smtClean="0">
-                <a:solidFill>
-                  <a:schemeClr val="tx1"/>
-                </a:solidFill>
-              </a:rPr>
-              <a:t>67</a:t>
-            </a:r>
-            <a:endParaRPr lang="en-US" dirty="0">
-              <a:solidFill>
-                <a:schemeClr val="tx1"/>
-              </a:solidFill>
-            </a:endParaRPr>
-          </a:p>
-        </p:txBody>
-      </p:sp>
-      <p:sp>
-        <p:nvSpPr>
-          <p:cNvPr id="20" name="Oval 19"/>
+              <a:rPr lang="en-US" dirty="0" smtClean="0"/>
+              <a:t>1.86</a:t>
+            </a:r>
+            <a:endParaRPr lang="en-US" dirty="0"/>
+          </a:p>
+        </p:txBody>
+      </p:sp>
+      <p:sp>
+        <p:nvSpPr>
+          <p:cNvPr id="13" name="Oval 12"/>
           <p:cNvSpPr/>
           <p:nvPr/>
         </p:nvSpPr>
         <p:spPr>
           <a:xfrm>
-            <a:off x="628652" y="5343525"/>
-            <a:ext cx="900112" cy="885825"/>
+            <a:off x="9362859" y="3098013"/>
+            <a:ext cx="957262" cy="885825"/>
           </a:xfrm>
           <a:prstGeom prst="ellipse">
             <a:avLst/>
           </a:prstGeom>
           <a:solidFill>
-            <a:schemeClr val="bg2">
-              <a:lumMod val="90000"/>
-            </a:schemeClr>
+            <a:srgbClr val="C654B6"/>
           </a:solidFill>
         </p:spPr>
         <p:style>
@@ -3201,18 +3175,57 @@
           <a:p>
             <a:pPr algn="ctr"/>
             <a:r>
-              <a:rPr lang="en-US" smtClean="0">
-                <a:solidFill>
-                  <a:schemeClr val="tx1"/>
-                </a:solidFill>
-              </a:rPr>
-              <a:t>264</a:t>
-            </a:r>
-            <a:endParaRPr lang="en-US" dirty="0">
-              <a:solidFill>
-                <a:schemeClr val="tx1"/>
-              </a:solidFill>
-            </a:endParaRPr>
+              <a:rPr lang="en-US" dirty="0" smtClean="0"/>
+              <a:t>1</a:t>
+            </a:r>
+            <a:endParaRPr lang="en-US" dirty="0"/>
+          </a:p>
+        </p:txBody>
+      </p:sp>
+      <p:sp>
+        <p:nvSpPr>
+          <p:cNvPr id="17" name="Oval 16"/>
+          <p:cNvSpPr/>
+          <p:nvPr/>
+        </p:nvSpPr>
+        <p:spPr>
+          <a:xfrm>
+            <a:off x="1164758" y="392687"/>
+            <a:ext cx="957262" cy="885825"/>
+          </a:xfrm>
+          <a:prstGeom prst="ellipse">
+            <a:avLst/>
+          </a:prstGeom>
+          <a:solidFill>
+            <a:srgbClr val="C654B6"/>
+          </a:solidFill>
+        </p:spPr>
+        <p:style>
+          <a:lnRef idx="2">
+            <a:schemeClr val="accent1">
+              <a:shade val="50000"/>
+            </a:schemeClr>
+          </a:lnRef>
+          <a:fillRef idx="1">
+            <a:schemeClr val="accent1"/>
+          </a:fillRef>
+          <a:effectRef idx="0">
+            <a:schemeClr val="accent1"/>
+          </a:effectRef>
+          <a:fontRef idx="minor">
+            <a:schemeClr val="lt1"/>
+          </a:fontRef>
+        </p:style>
+        <p:txBody>
+          <a:bodyPr rtlCol="0" anchor="ctr"/>
+          <a:lstStyle/>
+          <a:p>
+            <a:pPr algn="ctr"/>
+            <a:r>
+              <a:rPr lang="en-US" dirty="0" smtClean="0"/>
+              <a:t>.28</a:t>
+            </a:r>
+            <a:endParaRPr lang="en-US" dirty="0"/>
           </a:p>
         </p:txBody>
       </p:sp>
@@ -3226,6 +3239,1254 @@
   <p:clrMapOvr>
     <a:masterClrMapping/>
   </p:clrMapOvr>
+</p:sld>
+</file>
+
+<file path=ppt/slides/slide2.xml><?xml version="1.0" encoding="utf-8"?>
+<p:sld xmlns:a="http://schemas.openxmlformats.org/drawingml/2006/main" xmlns:r="http://schemas.openxmlformats.org/officeDocument/2006/relationships" xmlns:p="http://schemas.openxmlformats.org/presentationml/2006/main">
+  <p:cSld>
+    <p:spTree>
+      <p:nvGrpSpPr>
+        <p:cNvPr id="1" name=""/>
+        <p:cNvGrpSpPr/>
+        <p:nvPr/>
+      </p:nvGrpSpPr>
+      <p:grpSpPr>
+        <a:xfrm>
+          <a:off x="0" y="0"/>
+          <a:ext cx="0" cy="0"/>
+          <a:chOff x="0" y="0"/>
+          <a:chExt cx="0" cy="0"/>
+        </a:xfrm>
+      </p:grpSpPr>
+      <p:pic>
+        <p:nvPicPr>
+          <p:cNvPr id="4" name="Picture 3"/>
+          <p:cNvPicPr>
+            <a:picLocks noChangeAspect="1"/>
+          </p:cNvPicPr>
+          <p:nvPr/>
+        </p:nvPicPr>
+        <p:blipFill>
+          <a:blip r:embed="rId2">
+            <a:alphaModFix amt="50000"/>
+            <a:extLst>
+              <a:ext uri="{28A0092B-C50C-407E-A947-70E740481C1C}">
+                <a14:useLocalDpi xmlns:a14="http://schemas.microsoft.com/office/drawing/2010/main" val="0"/>
+              </a:ext>
+            </a:extLst>
+          </a:blip>
+          <a:stretch>
+            <a:fillRect/>
+          </a:stretch>
+        </p:blipFill>
+        <p:spPr>
+          <a:xfrm>
+            <a:off x="284162" y="0"/>
+            <a:ext cx="11473505" cy="6858000"/>
+          </a:xfrm>
+          <a:prstGeom prst="rect">
+            <a:avLst/>
+          </a:prstGeom>
+        </p:spPr>
+      </p:pic>
+      <p:graphicFrame>
+        <p:nvGraphicFramePr>
+          <p:cNvPr id="5" name="Table 4"/>
+          <p:cNvGraphicFramePr>
+            <a:graphicFrameLocks noGrp="1"/>
+          </p:cNvGraphicFramePr>
+          <p:nvPr>
+            <p:extLst>
+              <p:ext uri="{D42A27DB-BD31-4B8C-83A1-F6EECF244321}">
+                <p14:modId xmlns:p14="http://schemas.microsoft.com/office/powerpoint/2010/main" val="1441210163"/>
+              </p:ext>
+            </p:extLst>
+          </p:nvPr>
+        </p:nvGraphicFramePr>
+        <p:xfrm>
+          <a:off x="528637" y="971550"/>
+          <a:ext cx="10572758" cy="5586416"/>
+        </p:xfrm>
+        <a:graphic>
+          <a:graphicData uri="http://schemas.openxmlformats.org/drawingml/2006/table">
+            <a:tbl>
+              <a:tblPr firstRow="1" bandRow="1">
+                <a:tableStyleId>{5940675A-B579-460E-94D1-54222C63F5DA}</a:tableStyleId>
+              </a:tblPr>
+              <a:tblGrid>
+                <a:gridCol w="755197"/>
+                <a:gridCol w="755197"/>
+                <a:gridCol w="755197"/>
+                <a:gridCol w="755197"/>
+                <a:gridCol w="755197"/>
+                <a:gridCol w="755197"/>
+                <a:gridCol w="755197"/>
+                <a:gridCol w="755197"/>
+                <a:gridCol w="755197"/>
+                <a:gridCol w="755197"/>
+                <a:gridCol w="755197"/>
+                <a:gridCol w="755197"/>
+                <a:gridCol w="755197"/>
+                <a:gridCol w="755197"/>
+              </a:tblGrid>
+              <a:tr h="695586">
+                <a:tc>
+                  <a:txBody>
+                    <a:bodyPr/>
+                    <a:lstStyle/>
+                    <a:p>
+                      <a:endParaRPr lang="en-US" dirty="0"/>
+                    </a:p>
+                  </a:txBody>
+                  <a:tcPr/>
+                </a:tc>
+                <a:tc>
+                  <a:txBody>
+                    <a:bodyPr/>
+                    <a:lstStyle/>
+                    <a:p>
+                      <a:endParaRPr lang="en-US"/>
+                    </a:p>
+                  </a:txBody>
+                  <a:tcPr/>
+                </a:tc>
+                <a:tc>
+                  <a:txBody>
+                    <a:bodyPr/>
+                    <a:lstStyle/>
+                    <a:p>
+                      <a:endParaRPr lang="en-US"/>
+                    </a:p>
+                  </a:txBody>
+                  <a:tcPr/>
+                </a:tc>
+                <a:tc>
+                  <a:txBody>
+                    <a:bodyPr/>
+                    <a:lstStyle/>
+                    <a:p>
+                      <a:endParaRPr lang="en-US"/>
+                    </a:p>
+                  </a:txBody>
+                  <a:tcPr/>
+                </a:tc>
+                <a:tc>
+                  <a:txBody>
+                    <a:bodyPr/>
+                    <a:lstStyle/>
+                    <a:p>
+                      <a:endParaRPr lang="en-US"/>
+                    </a:p>
+                  </a:txBody>
+                  <a:tcPr/>
+                </a:tc>
+                <a:tc>
+                  <a:txBody>
+                    <a:bodyPr/>
+                    <a:lstStyle/>
+                    <a:p>
+                      <a:endParaRPr lang="en-US"/>
+                    </a:p>
+                  </a:txBody>
+                  <a:tcPr/>
+                </a:tc>
+                <a:tc>
+                  <a:txBody>
+                    <a:bodyPr/>
+                    <a:lstStyle/>
+                    <a:p>
+                      <a:endParaRPr lang="en-US"/>
+                    </a:p>
+                  </a:txBody>
+                  <a:tcPr/>
+                </a:tc>
+                <a:tc>
+                  <a:txBody>
+                    <a:bodyPr/>
+                    <a:lstStyle/>
+                    <a:p>
+                      <a:endParaRPr lang="en-US"/>
+                    </a:p>
+                  </a:txBody>
+                  <a:tcPr/>
+                </a:tc>
+                <a:tc>
+                  <a:txBody>
+                    <a:bodyPr/>
+                    <a:lstStyle/>
+                    <a:p>
+                      <a:endParaRPr lang="en-US"/>
+                    </a:p>
+                  </a:txBody>
+                  <a:tcPr/>
+                </a:tc>
+                <a:tc>
+                  <a:txBody>
+                    <a:bodyPr/>
+                    <a:lstStyle/>
+                    <a:p>
+                      <a:endParaRPr lang="en-US"/>
+                    </a:p>
+                  </a:txBody>
+                  <a:tcPr/>
+                </a:tc>
+                <a:tc>
+                  <a:txBody>
+                    <a:bodyPr/>
+                    <a:lstStyle/>
+                    <a:p>
+                      <a:endParaRPr lang="en-US"/>
+                    </a:p>
+                  </a:txBody>
+                  <a:tcPr/>
+                </a:tc>
+                <a:tc>
+                  <a:txBody>
+                    <a:bodyPr/>
+                    <a:lstStyle/>
+                    <a:p>
+                      <a:endParaRPr lang="en-US" dirty="0"/>
+                    </a:p>
+                  </a:txBody>
+                  <a:tcPr/>
+                </a:tc>
+                <a:tc>
+                  <a:txBody>
+                    <a:bodyPr/>
+                    <a:lstStyle/>
+                    <a:p>
+                      <a:endParaRPr lang="en-US"/>
+                    </a:p>
+                  </a:txBody>
+                  <a:tcPr/>
+                </a:tc>
+                <a:tc>
+                  <a:txBody>
+                    <a:bodyPr/>
+                    <a:lstStyle/>
+                    <a:p>
+                      <a:endParaRPr lang="en-US"/>
+                    </a:p>
+                  </a:txBody>
+                  <a:tcPr/>
+                </a:tc>
+              </a:tr>
+              <a:tr h="698690">
+                <a:tc>
+                  <a:txBody>
+                    <a:bodyPr/>
+                    <a:lstStyle/>
+                    <a:p>
+                      <a:endParaRPr lang="en-US"/>
+                    </a:p>
+                  </a:txBody>
+                  <a:tcPr/>
+                </a:tc>
+                <a:tc>
+                  <a:txBody>
+                    <a:bodyPr/>
+                    <a:lstStyle/>
+                    <a:p>
+                      <a:endParaRPr lang="en-US"/>
+                    </a:p>
+                  </a:txBody>
+                  <a:tcPr/>
+                </a:tc>
+                <a:tc>
+                  <a:txBody>
+                    <a:bodyPr/>
+                    <a:lstStyle/>
+                    <a:p>
+                      <a:endParaRPr lang="en-US"/>
+                    </a:p>
+                  </a:txBody>
+                  <a:tcPr/>
+                </a:tc>
+                <a:tc>
+                  <a:txBody>
+                    <a:bodyPr/>
+                    <a:lstStyle/>
+                    <a:p>
+                      <a:endParaRPr lang="en-US"/>
+                    </a:p>
+                  </a:txBody>
+                  <a:tcPr/>
+                </a:tc>
+                <a:tc>
+                  <a:txBody>
+                    <a:bodyPr/>
+                    <a:lstStyle/>
+                    <a:p>
+                      <a:endParaRPr lang="en-US"/>
+                    </a:p>
+                  </a:txBody>
+                  <a:tcPr/>
+                </a:tc>
+                <a:tc>
+                  <a:txBody>
+                    <a:bodyPr/>
+                    <a:lstStyle/>
+                    <a:p>
+                      <a:endParaRPr lang="en-US"/>
+                    </a:p>
+                  </a:txBody>
+                  <a:tcPr/>
+                </a:tc>
+                <a:tc>
+                  <a:txBody>
+                    <a:bodyPr/>
+                    <a:lstStyle/>
+                    <a:p>
+                      <a:endParaRPr lang="en-US"/>
+                    </a:p>
+                  </a:txBody>
+                  <a:tcPr/>
+                </a:tc>
+                <a:tc>
+                  <a:txBody>
+                    <a:bodyPr/>
+                    <a:lstStyle/>
+                    <a:p>
+                      <a:endParaRPr lang="en-US"/>
+                    </a:p>
+                  </a:txBody>
+                  <a:tcPr/>
+                </a:tc>
+                <a:tc>
+                  <a:txBody>
+                    <a:bodyPr/>
+                    <a:lstStyle/>
+                    <a:p>
+                      <a:endParaRPr lang="en-US"/>
+                    </a:p>
+                  </a:txBody>
+                  <a:tcPr/>
+                </a:tc>
+                <a:tc>
+                  <a:txBody>
+                    <a:bodyPr/>
+                    <a:lstStyle/>
+                    <a:p>
+                      <a:endParaRPr lang="en-US"/>
+                    </a:p>
+                  </a:txBody>
+                  <a:tcPr/>
+                </a:tc>
+                <a:tc>
+                  <a:txBody>
+                    <a:bodyPr/>
+                    <a:lstStyle/>
+                    <a:p>
+                      <a:endParaRPr lang="en-US"/>
+                    </a:p>
+                  </a:txBody>
+                  <a:tcPr/>
+                </a:tc>
+                <a:tc>
+                  <a:txBody>
+                    <a:bodyPr/>
+                    <a:lstStyle/>
+                    <a:p>
+                      <a:endParaRPr lang="en-US"/>
+                    </a:p>
+                  </a:txBody>
+                  <a:tcPr/>
+                </a:tc>
+                <a:tc>
+                  <a:txBody>
+                    <a:bodyPr/>
+                    <a:lstStyle/>
+                    <a:p>
+                      <a:endParaRPr lang="en-US"/>
+                    </a:p>
+                  </a:txBody>
+                  <a:tcPr/>
+                </a:tc>
+                <a:tc>
+                  <a:txBody>
+                    <a:bodyPr/>
+                    <a:lstStyle/>
+                    <a:p>
+                      <a:endParaRPr lang="en-US"/>
+                    </a:p>
+                  </a:txBody>
+                  <a:tcPr/>
+                </a:tc>
+              </a:tr>
+              <a:tr h="698690">
+                <a:tc>
+                  <a:txBody>
+                    <a:bodyPr/>
+                    <a:lstStyle/>
+                    <a:p>
+                      <a:endParaRPr lang="en-US"/>
+                    </a:p>
+                  </a:txBody>
+                  <a:tcPr/>
+                </a:tc>
+                <a:tc>
+                  <a:txBody>
+                    <a:bodyPr/>
+                    <a:lstStyle/>
+                    <a:p>
+                      <a:endParaRPr lang="en-US"/>
+                    </a:p>
+                  </a:txBody>
+                  <a:tcPr/>
+                </a:tc>
+                <a:tc>
+                  <a:txBody>
+                    <a:bodyPr/>
+                    <a:lstStyle/>
+                    <a:p>
+                      <a:endParaRPr lang="en-US"/>
+                    </a:p>
+                  </a:txBody>
+                  <a:tcPr/>
+                </a:tc>
+                <a:tc>
+                  <a:txBody>
+                    <a:bodyPr/>
+                    <a:lstStyle/>
+                    <a:p>
+                      <a:endParaRPr lang="en-US"/>
+                    </a:p>
+                  </a:txBody>
+                  <a:tcPr/>
+                </a:tc>
+                <a:tc>
+                  <a:txBody>
+                    <a:bodyPr/>
+                    <a:lstStyle/>
+                    <a:p>
+                      <a:endParaRPr lang="en-US"/>
+                    </a:p>
+                  </a:txBody>
+                  <a:tcPr/>
+                </a:tc>
+                <a:tc>
+                  <a:txBody>
+                    <a:bodyPr/>
+                    <a:lstStyle/>
+                    <a:p>
+                      <a:endParaRPr lang="en-US"/>
+                    </a:p>
+                  </a:txBody>
+                  <a:tcPr/>
+                </a:tc>
+                <a:tc>
+                  <a:txBody>
+                    <a:bodyPr/>
+                    <a:lstStyle/>
+                    <a:p>
+                      <a:endParaRPr lang="en-US"/>
+                    </a:p>
+                  </a:txBody>
+                  <a:tcPr/>
+                </a:tc>
+                <a:tc>
+                  <a:txBody>
+                    <a:bodyPr/>
+                    <a:lstStyle/>
+                    <a:p>
+                      <a:endParaRPr lang="en-US"/>
+                    </a:p>
+                  </a:txBody>
+                  <a:tcPr/>
+                </a:tc>
+                <a:tc>
+                  <a:txBody>
+                    <a:bodyPr/>
+                    <a:lstStyle/>
+                    <a:p>
+                      <a:endParaRPr lang="en-US"/>
+                    </a:p>
+                  </a:txBody>
+                  <a:tcPr/>
+                </a:tc>
+                <a:tc>
+                  <a:txBody>
+                    <a:bodyPr/>
+                    <a:lstStyle/>
+                    <a:p>
+                      <a:endParaRPr lang="en-US"/>
+                    </a:p>
+                  </a:txBody>
+                  <a:tcPr/>
+                </a:tc>
+                <a:tc>
+                  <a:txBody>
+                    <a:bodyPr/>
+                    <a:lstStyle/>
+                    <a:p>
+                      <a:endParaRPr lang="en-US"/>
+                    </a:p>
+                  </a:txBody>
+                  <a:tcPr/>
+                </a:tc>
+                <a:tc>
+                  <a:txBody>
+                    <a:bodyPr/>
+                    <a:lstStyle/>
+                    <a:p>
+                      <a:endParaRPr lang="en-US"/>
+                    </a:p>
+                  </a:txBody>
+                  <a:tcPr/>
+                </a:tc>
+                <a:tc>
+                  <a:txBody>
+                    <a:bodyPr/>
+                    <a:lstStyle/>
+                    <a:p>
+                      <a:endParaRPr lang="en-US"/>
+                    </a:p>
+                  </a:txBody>
+                  <a:tcPr/>
+                </a:tc>
+                <a:tc>
+                  <a:txBody>
+                    <a:bodyPr/>
+                    <a:lstStyle/>
+                    <a:p>
+                      <a:endParaRPr lang="en-US"/>
+                    </a:p>
+                  </a:txBody>
+                  <a:tcPr/>
+                </a:tc>
+              </a:tr>
+              <a:tr h="698690">
+                <a:tc>
+                  <a:txBody>
+                    <a:bodyPr/>
+                    <a:lstStyle/>
+                    <a:p>
+                      <a:endParaRPr lang="en-US"/>
+                    </a:p>
+                  </a:txBody>
+                  <a:tcPr/>
+                </a:tc>
+                <a:tc>
+                  <a:txBody>
+                    <a:bodyPr/>
+                    <a:lstStyle/>
+                    <a:p>
+                      <a:endParaRPr lang="en-US"/>
+                    </a:p>
+                  </a:txBody>
+                  <a:tcPr/>
+                </a:tc>
+                <a:tc>
+                  <a:txBody>
+                    <a:bodyPr/>
+                    <a:lstStyle/>
+                    <a:p>
+                      <a:endParaRPr lang="en-US"/>
+                    </a:p>
+                  </a:txBody>
+                  <a:tcPr/>
+                </a:tc>
+                <a:tc>
+                  <a:txBody>
+                    <a:bodyPr/>
+                    <a:lstStyle/>
+                    <a:p>
+                      <a:endParaRPr lang="en-US"/>
+                    </a:p>
+                  </a:txBody>
+                  <a:tcPr/>
+                </a:tc>
+                <a:tc>
+                  <a:txBody>
+                    <a:bodyPr/>
+                    <a:lstStyle/>
+                    <a:p>
+                      <a:endParaRPr lang="en-US"/>
+                    </a:p>
+                  </a:txBody>
+                  <a:tcPr/>
+                </a:tc>
+                <a:tc>
+                  <a:txBody>
+                    <a:bodyPr/>
+                    <a:lstStyle/>
+                    <a:p>
+                      <a:endParaRPr lang="en-US"/>
+                    </a:p>
+                  </a:txBody>
+                  <a:tcPr/>
+                </a:tc>
+                <a:tc>
+                  <a:txBody>
+                    <a:bodyPr/>
+                    <a:lstStyle/>
+                    <a:p>
+                      <a:endParaRPr lang="en-US"/>
+                    </a:p>
+                  </a:txBody>
+                  <a:tcPr/>
+                </a:tc>
+                <a:tc>
+                  <a:txBody>
+                    <a:bodyPr/>
+                    <a:lstStyle/>
+                    <a:p>
+                      <a:endParaRPr lang="en-US"/>
+                    </a:p>
+                  </a:txBody>
+                  <a:tcPr/>
+                </a:tc>
+                <a:tc>
+                  <a:txBody>
+                    <a:bodyPr/>
+                    <a:lstStyle/>
+                    <a:p>
+                      <a:endParaRPr lang="en-US"/>
+                    </a:p>
+                  </a:txBody>
+                  <a:tcPr/>
+                </a:tc>
+                <a:tc>
+                  <a:txBody>
+                    <a:bodyPr/>
+                    <a:lstStyle/>
+                    <a:p>
+                      <a:endParaRPr lang="en-US"/>
+                    </a:p>
+                  </a:txBody>
+                  <a:tcPr/>
+                </a:tc>
+                <a:tc>
+                  <a:txBody>
+                    <a:bodyPr/>
+                    <a:lstStyle/>
+                    <a:p>
+                      <a:endParaRPr lang="en-US"/>
+                    </a:p>
+                  </a:txBody>
+                  <a:tcPr/>
+                </a:tc>
+                <a:tc>
+                  <a:txBody>
+                    <a:bodyPr/>
+                    <a:lstStyle/>
+                    <a:p>
+                      <a:endParaRPr lang="en-US"/>
+                    </a:p>
+                  </a:txBody>
+                  <a:tcPr/>
+                </a:tc>
+                <a:tc>
+                  <a:txBody>
+                    <a:bodyPr/>
+                    <a:lstStyle/>
+                    <a:p>
+                      <a:endParaRPr lang="en-US"/>
+                    </a:p>
+                  </a:txBody>
+                  <a:tcPr/>
+                </a:tc>
+                <a:tc>
+                  <a:txBody>
+                    <a:bodyPr/>
+                    <a:lstStyle/>
+                    <a:p>
+                      <a:endParaRPr lang="en-US"/>
+                    </a:p>
+                  </a:txBody>
+                  <a:tcPr/>
+                </a:tc>
+              </a:tr>
+              <a:tr h="698690">
+                <a:tc>
+                  <a:txBody>
+                    <a:bodyPr/>
+                    <a:lstStyle/>
+                    <a:p>
+                      <a:endParaRPr lang="en-US"/>
+                    </a:p>
+                  </a:txBody>
+                  <a:tcPr/>
+                </a:tc>
+                <a:tc>
+                  <a:txBody>
+                    <a:bodyPr/>
+                    <a:lstStyle/>
+                    <a:p>
+                      <a:endParaRPr lang="en-US"/>
+                    </a:p>
+                  </a:txBody>
+                  <a:tcPr/>
+                </a:tc>
+                <a:tc>
+                  <a:txBody>
+                    <a:bodyPr/>
+                    <a:lstStyle/>
+                    <a:p>
+                      <a:endParaRPr lang="en-US"/>
+                    </a:p>
+                  </a:txBody>
+                  <a:tcPr/>
+                </a:tc>
+                <a:tc>
+                  <a:txBody>
+                    <a:bodyPr/>
+                    <a:lstStyle/>
+                    <a:p>
+                      <a:endParaRPr lang="en-US"/>
+                    </a:p>
+                  </a:txBody>
+                  <a:tcPr/>
+                </a:tc>
+                <a:tc>
+                  <a:txBody>
+                    <a:bodyPr/>
+                    <a:lstStyle/>
+                    <a:p>
+                      <a:endParaRPr lang="en-US"/>
+                    </a:p>
+                  </a:txBody>
+                  <a:tcPr/>
+                </a:tc>
+                <a:tc>
+                  <a:txBody>
+                    <a:bodyPr/>
+                    <a:lstStyle/>
+                    <a:p>
+                      <a:endParaRPr lang="en-US"/>
+                    </a:p>
+                  </a:txBody>
+                  <a:tcPr/>
+                </a:tc>
+                <a:tc>
+                  <a:txBody>
+                    <a:bodyPr/>
+                    <a:lstStyle/>
+                    <a:p>
+                      <a:endParaRPr lang="en-US"/>
+                    </a:p>
+                  </a:txBody>
+                  <a:tcPr/>
+                </a:tc>
+                <a:tc>
+                  <a:txBody>
+                    <a:bodyPr/>
+                    <a:lstStyle/>
+                    <a:p>
+                      <a:endParaRPr lang="en-US"/>
+                    </a:p>
+                  </a:txBody>
+                  <a:tcPr/>
+                </a:tc>
+                <a:tc>
+                  <a:txBody>
+                    <a:bodyPr/>
+                    <a:lstStyle/>
+                    <a:p>
+                      <a:endParaRPr lang="en-US"/>
+                    </a:p>
+                  </a:txBody>
+                  <a:tcPr/>
+                </a:tc>
+                <a:tc>
+                  <a:txBody>
+                    <a:bodyPr/>
+                    <a:lstStyle/>
+                    <a:p>
+                      <a:endParaRPr lang="en-US"/>
+                    </a:p>
+                  </a:txBody>
+                  <a:tcPr/>
+                </a:tc>
+                <a:tc>
+                  <a:txBody>
+                    <a:bodyPr/>
+                    <a:lstStyle/>
+                    <a:p>
+                      <a:endParaRPr lang="en-US"/>
+                    </a:p>
+                  </a:txBody>
+                  <a:tcPr/>
+                </a:tc>
+                <a:tc>
+                  <a:txBody>
+                    <a:bodyPr/>
+                    <a:lstStyle/>
+                    <a:p>
+                      <a:endParaRPr lang="en-US"/>
+                    </a:p>
+                  </a:txBody>
+                  <a:tcPr/>
+                </a:tc>
+                <a:tc>
+                  <a:txBody>
+                    <a:bodyPr/>
+                    <a:lstStyle/>
+                    <a:p>
+                      <a:endParaRPr lang="en-US"/>
+                    </a:p>
+                  </a:txBody>
+                  <a:tcPr/>
+                </a:tc>
+                <a:tc>
+                  <a:txBody>
+                    <a:bodyPr/>
+                    <a:lstStyle/>
+                    <a:p>
+                      <a:endParaRPr lang="en-US"/>
+                    </a:p>
+                  </a:txBody>
+                  <a:tcPr/>
+                </a:tc>
+              </a:tr>
+              <a:tr h="698690">
+                <a:tc>
+                  <a:txBody>
+                    <a:bodyPr/>
+                    <a:lstStyle/>
+                    <a:p>
+                      <a:endParaRPr lang="en-US"/>
+                    </a:p>
+                  </a:txBody>
+                  <a:tcPr/>
+                </a:tc>
+                <a:tc>
+                  <a:txBody>
+                    <a:bodyPr/>
+                    <a:lstStyle/>
+                    <a:p>
+                      <a:endParaRPr lang="en-US"/>
+                    </a:p>
+                  </a:txBody>
+                  <a:tcPr/>
+                </a:tc>
+                <a:tc>
+                  <a:txBody>
+                    <a:bodyPr/>
+                    <a:lstStyle/>
+                    <a:p>
+                      <a:endParaRPr lang="en-US"/>
+                    </a:p>
+                  </a:txBody>
+                  <a:tcPr/>
+                </a:tc>
+                <a:tc>
+                  <a:txBody>
+                    <a:bodyPr/>
+                    <a:lstStyle/>
+                    <a:p>
+                      <a:endParaRPr lang="en-US"/>
+                    </a:p>
+                  </a:txBody>
+                  <a:tcPr/>
+                </a:tc>
+                <a:tc>
+                  <a:txBody>
+                    <a:bodyPr/>
+                    <a:lstStyle/>
+                    <a:p>
+                      <a:endParaRPr lang="en-US"/>
+                    </a:p>
+                  </a:txBody>
+                  <a:tcPr/>
+                </a:tc>
+                <a:tc>
+                  <a:txBody>
+                    <a:bodyPr/>
+                    <a:lstStyle/>
+                    <a:p>
+                      <a:endParaRPr lang="en-US"/>
+                    </a:p>
+                  </a:txBody>
+                  <a:tcPr/>
+                </a:tc>
+                <a:tc>
+                  <a:txBody>
+                    <a:bodyPr/>
+                    <a:lstStyle/>
+                    <a:p>
+                      <a:endParaRPr lang="en-US"/>
+                    </a:p>
+                  </a:txBody>
+                  <a:tcPr/>
+                </a:tc>
+                <a:tc>
+                  <a:txBody>
+                    <a:bodyPr/>
+                    <a:lstStyle/>
+                    <a:p>
+                      <a:endParaRPr lang="en-US"/>
+                    </a:p>
+                  </a:txBody>
+                  <a:tcPr/>
+                </a:tc>
+                <a:tc>
+                  <a:txBody>
+                    <a:bodyPr/>
+                    <a:lstStyle/>
+                    <a:p>
+                      <a:endParaRPr lang="en-US"/>
+                    </a:p>
+                  </a:txBody>
+                  <a:tcPr/>
+                </a:tc>
+                <a:tc>
+                  <a:txBody>
+                    <a:bodyPr/>
+                    <a:lstStyle/>
+                    <a:p>
+                      <a:endParaRPr lang="en-US"/>
+                    </a:p>
+                  </a:txBody>
+                  <a:tcPr/>
+                </a:tc>
+                <a:tc>
+                  <a:txBody>
+                    <a:bodyPr/>
+                    <a:lstStyle/>
+                    <a:p>
+                      <a:endParaRPr lang="en-US"/>
+                    </a:p>
+                  </a:txBody>
+                  <a:tcPr/>
+                </a:tc>
+                <a:tc>
+                  <a:txBody>
+                    <a:bodyPr/>
+                    <a:lstStyle/>
+                    <a:p>
+                      <a:endParaRPr lang="en-US"/>
+                    </a:p>
+                  </a:txBody>
+                  <a:tcPr/>
+                </a:tc>
+                <a:tc>
+                  <a:txBody>
+                    <a:bodyPr/>
+                    <a:lstStyle/>
+                    <a:p>
+                      <a:endParaRPr lang="en-US"/>
+                    </a:p>
+                  </a:txBody>
+                  <a:tcPr/>
+                </a:tc>
+                <a:tc>
+                  <a:txBody>
+                    <a:bodyPr/>
+                    <a:lstStyle/>
+                    <a:p>
+                      <a:endParaRPr lang="en-US"/>
+                    </a:p>
+                  </a:txBody>
+                  <a:tcPr/>
+                </a:tc>
+              </a:tr>
+              <a:tr h="698690">
+                <a:tc>
+                  <a:txBody>
+                    <a:bodyPr/>
+                    <a:lstStyle/>
+                    <a:p>
+                      <a:endParaRPr lang="en-US"/>
+                    </a:p>
+                  </a:txBody>
+                  <a:tcPr/>
+                </a:tc>
+                <a:tc>
+                  <a:txBody>
+                    <a:bodyPr/>
+                    <a:lstStyle/>
+                    <a:p>
+                      <a:endParaRPr lang="en-US"/>
+                    </a:p>
+                  </a:txBody>
+                  <a:tcPr/>
+                </a:tc>
+                <a:tc>
+                  <a:txBody>
+                    <a:bodyPr/>
+                    <a:lstStyle/>
+                    <a:p>
+                      <a:endParaRPr lang="en-US"/>
+                    </a:p>
+                  </a:txBody>
+                  <a:tcPr/>
+                </a:tc>
+                <a:tc>
+                  <a:txBody>
+                    <a:bodyPr/>
+                    <a:lstStyle/>
+                    <a:p>
+                      <a:endParaRPr lang="en-US"/>
+                    </a:p>
+                  </a:txBody>
+                  <a:tcPr/>
+                </a:tc>
+                <a:tc>
+                  <a:txBody>
+                    <a:bodyPr/>
+                    <a:lstStyle/>
+                    <a:p>
+                      <a:endParaRPr lang="en-US"/>
+                    </a:p>
+                  </a:txBody>
+                  <a:tcPr/>
+                </a:tc>
+                <a:tc>
+                  <a:txBody>
+                    <a:bodyPr/>
+                    <a:lstStyle/>
+                    <a:p>
+                      <a:endParaRPr lang="en-US"/>
+                    </a:p>
+                  </a:txBody>
+                  <a:tcPr/>
+                </a:tc>
+                <a:tc>
+                  <a:txBody>
+                    <a:bodyPr/>
+                    <a:lstStyle/>
+                    <a:p>
+                      <a:endParaRPr lang="en-US"/>
+                    </a:p>
+                  </a:txBody>
+                  <a:tcPr/>
+                </a:tc>
+                <a:tc>
+                  <a:txBody>
+                    <a:bodyPr/>
+                    <a:lstStyle/>
+                    <a:p>
+                      <a:endParaRPr lang="en-US"/>
+                    </a:p>
+                  </a:txBody>
+                  <a:tcPr/>
+                </a:tc>
+                <a:tc>
+                  <a:txBody>
+                    <a:bodyPr/>
+                    <a:lstStyle/>
+                    <a:p>
+                      <a:endParaRPr lang="en-US"/>
+                    </a:p>
+                  </a:txBody>
+                  <a:tcPr/>
+                </a:tc>
+                <a:tc>
+                  <a:txBody>
+                    <a:bodyPr/>
+                    <a:lstStyle/>
+                    <a:p>
+                      <a:endParaRPr lang="en-US"/>
+                    </a:p>
+                  </a:txBody>
+                  <a:tcPr/>
+                </a:tc>
+                <a:tc>
+                  <a:txBody>
+                    <a:bodyPr/>
+                    <a:lstStyle/>
+                    <a:p>
+                      <a:endParaRPr lang="en-US"/>
+                    </a:p>
+                  </a:txBody>
+                  <a:tcPr/>
+                </a:tc>
+                <a:tc>
+                  <a:txBody>
+                    <a:bodyPr/>
+                    <a:lstStyle/>
+                    <a:p>
+                      <a:endParaRPr lang="en-US"/>
+                    </a:p>
+                  </a:txBody>
+                  <a:tcPr/>
+                </a:tc>
+                <a:tc>
+                  <a:txBody>
+                    <a:bodyPr/>
+                    <a:lstStyle/>
+                    <a:p>
+                      <a:endParaRPr lang="en-US"/>
+                    </a:p>
+                  </a:txBody>
+                  <a:tcPr/>
+                </a:tc>
+                <a:tc>
+                  <a:txBody>
+                    <a:bodyPr/>
+                    <a:lstStyle/>
+                    <a:p>
+                      <a:endParaRPr lang="en-US"/>
+                    </a:p>
+                  </a:txBody>
+                  <a:tcPr/>
+                </a:tc>
+              </a:tr>
+              <a:tr h="698690">
+                <a:tc>
+                  <a:txBody>
+                    <a:bodyPr/>
+                    <a:lstStyle/>
+                    <a:p>
+                      <a:endParaRPr lang="en-US"/>
+                    </a:p>
+                  </a:txBody>
+                  <a:tcPr/>
+                </a:tc>
+                <a:tc>
+                  <a:txBody>
+                    <a:bodyPr/>
+                    <a:lstStyle/>
+                    <a:p>
+                      <a:endParaRPr lang="en-US"/>
+                    </a:p>
+                  </a:txBody>
+                  <a:tcPr/>
+                </a:tc>
+                <a:tc>
+                  <a:txBody>
+                    <a:bodyPr/>
+                    <a:lstStyle/>
+                    <a:p>
+                      <a:endParaRPr lang="en-US"/>
+                    </a:p>
+                  </a:txBody>
+                  <a:tcPr/>
+                </a:tc>
+                <a:tc>
+                  <a:txBody>
+                    <a:bodyPr/>
+                    <a:lstStyle/>
+                    <a:p>
+                      <a:endParaRPr lang="en-US"/>
+                    </a:p>
+                  </a:txBody>
+                  <a:tcPr/>
+                </a:tc>
+                <a:tc>
+                  <a:txBody>
+                    <a:bodyPr/>
+                    <a:lstStyle/>
+                    <a:p>
+                      <a:endParaRPr lang="en-US"/>
+                    </a:p>
+                  </a:txBody>
+                  <a:tcPr/>
+                </a:tc>
+                <a:tc>
+                  <a:txBody>
+                    <a:bodyPr/>
+                    <a:lstStyle/>
+                    <a:p>
+                      <a:endParaRPr lang="en-US"/>
+                    </a:p>
+                  </a:txBody>
+                  <a:tcPr/>
+                </a:tc>
+                <a:tc>
+                  <a:txBody>
+                    <a:bodyPr/>
+                    <a:lstStyle/>
+                    <a:p>
+                      <a:endParaRPr lang="en-US"/>
+                    </a:p>
+                  </a:txBody>
+                  <a:tcPr/>
+                </a:tc>
+                <a:tc>
+                  <a:txBody>
+                    <a:bodyPr/>
+                    <a:lstStyle/>
+                    <a:p>
+                      <a:endParaRPr lang="en-US"/>
+                    </a:p>
+                  </a:txBody>
+                  <a:tcPr/>
+                </a:tc>
+                <a:tc>
+                  <a:txBody>
+                    <a:bodyPr/>
+                    <a:lstStyle/>
+                    <a:p>
+                      <a:endParaRPr lang="en-US"/>
+                    </a:p>
+                  </a:txBody>
+                  <a:tcPr/>
+                </a:tc>
+                <a:tc>
+                  <a:txBody>
+                    <a:bodyPr/>
+                    <a:lstStyle/>
+                    <a:p>
+                      <a:endParaRPr lang="en-US"/>
+                    </a:p>
+                  </a:txBody>
+                  <a:tcPr/>
+                </a:tc>
+                <a:tc>
+                  <a:txBody>
+                    <a:bodyPr/>
+                    <a:lstStyle/>
+                    <a:p>
+                      <a:endParaRPr lang="en-US"/>
+                    </a:p>
+                  </a:txBody>
+                  <a:tcPr/>
+                </a:tc>
+                <a:tc>
+                  <a:txBody>
+                    <a:bodyPr/>
+                    <a:lstStyle/>
+                    <a:p>
+                      <a:endParaRPr lang="en-US"/>
+                    </a:p>
+                  </a:txBody>
+                  <a:tcPr/>
+                </a:tc>
+                <a:tc>
+                  <a:txBody>
+                    <a:bodyPr/>
+                    <a:lstStyle/>
+                    <a:p>
+                      <a:endParaRPr lang="en-US"/>
+                    </a:p>
+                  </a:txBody>
+                  <a:tcPr/>
+                </a:tc>
+                <a:tc>
+                  <a:txBody>
+                    <a:bodyPr/>
+                    <a:lstStyle/>
+                    <a:p>
+                      <a:endParaRPr lang="en-US" dirty="0"/>
+                    </a:p>
+                  </a:txBody>
+                  <a:tcPr/>
+                </a:tc>
+              </a:tr>
+            </a:tbl>
+          </a:graphicData>
+        </a:graphic>
+      </p:graphicFrame>
+    </p:spTree>
+    <p:extLst>
+      <p:ext uri="{BB962C8B-B14F-4D97-AF65-F5344CB8AC3E}">
+        <p14:creationId xmlns:p14="http://schemas.microsoft.com/office/powerpoint/2010/main" val="486817724"/>
+      </p:ext>
+    </p:extLst>
+  </p:cSld>
+  <p:clrMapOvr>
+    <a:masterClrMapping/>
+  </p:clrMapOvr>
+  <p:timing>
+    <p:tnLst>
+      <p:par>
+        <p:cTn id="1" dur="indefinite" restart="never" nodeType="tmRoot"/>
+      </p:par>
+    </p:tnLst>
+  </p:timing>
 </p:sld>
 </file>
 

</xml_diff>